<commit_message>
small improvements to 3.4 morning
</commit_message>
<xml_diff>
--- a/3-4 -- Multi-state and abundance estimation/Morning/3-4 morning -- abundance estimation in tag-resighting models.pptx
+++ b/3-4 -- Multi-state and abundance estimation/Morning/3-4 morning -- abundance estimation in tag-resighting models.pptx
@@ -5,7 +5,7 @@
     <p:sldMasterId id="2147483660" r:id="rId1"/>
   </p:sldMasterIdLst>
   <p:notesMasterIdLst>
-    <p:notesMasterId r:id="rId7"/>
+    <p:notesMasterId r:id="rId8"/>
   </p:notesMasterIdLst>
   <p:sldIdLst>
     <p:sldId id="257" r:id="rId2"/>
@@ -13,6 +13,7 @@
     <p:sldId id="259" r:id="rId4"/>
     <p:sldId id="260" r:id="rId5"/>
     <p:sldId id="261" r:id="rId6"/>
+    <p:sldId id="262" r:id="rId7"/>
   </p:sldIdLst>
   <p:sldSz cx="9144000" cy="6858000" type="screen4x3"/>
   <p:notesSz cx="6858000" cy="9144000"/>
@@ -562,7 +563,7 @@
           </a:ln>
           <a:extLst>
             <a:ext uri="{909E8E84-426E-40dd-AFC4-6F175D3DCCD1}">
-              <a14:hiddenFill xmlns:a14="http://schemas.microsoft.com/office/drawing/2010/main" xmlns="">
+              <a14:hiddenFill xmlns="" xmlns:a14="http://schemas.microsoft.com/office/drawing/2010/main">
                 <a:solidFill>
                   <a:srgbClr val="FFFFFF"/>
                 </a:solidFill>
@@ -605,7 +606,7 @@
           </a:ln>
           <a:extLst>
             <a:ext uri="{909E8E84-426E-40dd-AFC4-6F175D3DCCD1}">
-              <a14:hiddenFill xmlns:a14="http://schemas.microsoft.com/office/drawing/2010/main" xmlns="">
+              <a14:hiddenFill xmlns="" xmlns:a14="http://schemas.microsoft.com/office/drawing/2010/main">
                 <a:noFill/>
               </a14:hiddenFill>
             </a:ext>
@@ -4145,14 +4146,14 @@
           </a:ln>
           <a:extLst>
             <a:ext uri="{909E8E84-426E-40dd-AFC4-6F175D3DCCD1}">
-              <a14:hiddenFill xmlns:a14="http://schemas.microsoft.com/office/drawing/2010/main" xmlns="">
+              <a14:hiddenFill xmlns="" xmlns:a14="http://schemas.microsoft.com/office/drawing/2010/main">
                 <a:solidFill>
                   <a:srgbClr val="FFFFFF"/>
                 </a:solidFill>
               </a14:hiddenFill>
             </a:ext>
             <a:ext uri="{91240B29-F687-4f45-9708-019B960494DF}">
-              <a14:hiddenLine xmlns:a14="http://schemas.microsoft.com/office/drawing/2010/main" xmlns="" w="9525">
+              <a14:hiddenLine xmlns="" xmlns:a14="http://schemas.microsoft.com/office/drawing/2010/main" w="9525">
                 <a:solidFill>
                   <a:srgbClr val="000000"/>
                 </a:solidFill>
@@ -4162,7 +4163,7 @@
               </a14:hiddenLine>
             </a:ext>
             <a:ext uri="{FAA26D3D-D897-4be2-8F04-BA451C77F1D7}">
-              <ma14:placeholderFlag xmlns:ma14="http://schemas.microsoft.com/office/mac/drawingml/2011/main" xmlns="" val="1"/>
+              <ma14:placeholderFlag xmlns="" xmlns:ma14="http://schemas.microsoft.com/office/mac/drawingml/2011/main" val="1"/>
             </a:ext>
           </a:extLst>
         </p:spPr>
@@ -4207,14 +4208,14 @@
           </a:ln>
           <a:extLst>
             <a:ext uri="{909E8E84-426E-40dd-AFC4-6F175D3DCCD1}">
-              <a14:hiddenFill xmlns:a14="http://schemas.microsoft.com/office/drawing/2010/main" xmlns="">
+              <a14:hiddenFill xmlns="" xmlns:a14="http://schemas.microsoft.com/office/drawing/2010/main">
                 <a:solidFill>
                   <a:srgbClr val="FFFFFF"/>
                 </a:solidFill>
               </a14:hiddenFill>
             </a:ext>
             <a:ext uri="{91240B29-F687-4f45-9708-019B960494DF}">
-              <a14:hiddenLine xmlns:a14="http://schemas.microsoft.com/office/drawing/2010/main" xmlns="" w="9525">
+              <a14:hiddenLine xmlns="" xmlns:a14="http://schemas.microsoft.com/office/drawing/2010/main" w="9525">
                 <a:solidFill>
                   <a:srgbClr val="000000"/>
                 </a:solidFill>
@@ -4224,7 +4225,7 @@
               </a14:hiddenLine>
             </a:ext>
             <a:ext uri="{FAA26D3D-D897-4be2-8F04-BA451C77F1D7}">
-              <ma14:placeholderFlag xmlns:ma14="http://schemas.microsoft.com/office/mac/drawingml/2011/main" xmlns="" val="1"/>
+              <ma14:placeholderFlag xmlns="" xmlns:ma14="http://schemas.microsoft.com/office/mac/drawingml/2011/main" val="1"/>
             </a:ext>
           </a:extLst>
         </p:spPr>
@@ -4486,7 +4487,7 @@
           </a:ln>
           <a:extLst>
             <a:ext uri="{909E8E84-426E-40dd-AFC4-6F175D3DCCD1}">
-              <a14:hiddenFill xmlns:a14="http://schemas.microsoft.com/office/drawing/2010/main" xmlns="">
+              <a14:hiddenFill xmlns="" xmlns:a14="http://schemas.microsoft.com/office/drawing/2010/main">
                 <a:solidFill>
                   <a:srgbClr val="FFFFFF"/>
                 </a:solidFill>
@@ -4529,7 +4530,7 @@
           </a:ln>
           <a:extLst>
             <a:ext uri="{909E8E84-426E-40dd-AFC4-6F175D3DCCD1}">
-              <a14:hiddenFill xmlns:a14="http://schemas.microsoft.com/office/drawing/2010/main" xmlns="">
+              <a14:hiddenFill xmlns="" xmlns:a14="http://schemas.microsoft.com/office/drawing/2010/main">
                 <a:noFill/>
               </a14:hiddenFill>
             </a:ext>
@@ -5699,8 +5700,8 @@
           </a:p>
         </p:txBody>
       </p:sp>
-      <mc:AlternateContent xmlns:mc="http://schemas.openxmlformats.org/markup-compatibility/2006">
-        <mc:Choice xmlns:a14="http://schemas.microsoft.com/office/drawing/2010/main" Requires="a14">
+      <mc:AlternateContent xmlns:mc="http://schemas.openxmlformats.org/markup-compatibility/2006" xmlns:a14="http://schemas.microsoft.com/office/drawing/2010/main">
+        <mc:Choice Requires="a14">
           <p:sp>
             <p:nvSpPr>
               <p:cNvPr id="3" name="Content Placeholder 2"/>
@@ -6235,7 +6236,7 @@
             </p:txBody>
           </p:sp>
         </mc:Choice>
-        <mc:Fallback>
+        <mc:Fallback xmlns="">
           <p:sp>
             <p:nvSpPr>
               <p:cNvPr id="3" name="Content Placeholder 2"/>
@@ -6322,8 +6323,8 @@
           </a:p>
         </p:txBody>
       </p:sp>
-      <mc:AlternateContent xmlns:mc="http://schemas.openxmlformats.org/markup-compatibility/2006">
-        <mc:Choice xmlns:a14="http://schemas.microsoft.com/office/drawing/2010/main" Requires="a14">
+      <mc:AlternateContent xmlns:mc="http://schemas.openxmlformats.org/markup-compatibility/2006" xmlns:a14="http://schemas.microsoft.com/office/drawing/2010/main">
+        <mc:Choice Requires="a14">
           <p:sp>
             <p:nvSpPr>
               <p:cNvPr id="3" name="Content Placeholder 2"/>
@@ -6693,7 +6694,7 @@
             </p:txBody>
           </p:sp>
         </mc:Choice>
-        <mc:Fallback>
+        <mc:Fallback xmlns="">
           <p:sp>
             <p:nvSpPr>
               <p:cNvPr id="3" name="Content Placeholder 2"/>
@@ -6784,8 +6785,8 @@
           </a:p>
         </p:txBody>
       </p:sp>
-      <mc:AlternateContent xmlns:mc="http://schemas.openxmlformats.org/markup-compatibility/2006">
-        <mc:Choice xmlns:a14="http://schemas.microsoft.com/office/drawing/2010/main" Requires="a14">
+      <mc:AlternateContent xmlns:mc="http://schemas.openxmlformats.org/markup-compatibility/2006" xmlns:a14="http://schemas.microsoft.com/office/drawing/2010/main">
+        <mc:Choice Requires="a14">
           <p:sp>
             <p:nvSpPr>
               <p:cNvPr id="3" name="Content Placeholder 2"/>
@@ -7362,7 +7363,7 @@
             </p:txBody>
           </p:sp>
         </mc:Choice>
-        <mc:Fallback>
+        <mc:Fallback xmlns="">
           <p:sp>
             <p:nvSpPr>
               <p:cNvPr id="3" name="Content Placeholder 2"/>
@@ -7404,6 +7405,110 @@
     <p:extLst>
       <p:ext uri="{BB962C8B-B14F-4D97-AF65-F5344CB8AC3E}">
         <p14:creationId xmlns:p14="http://schemas.microsoft.com/office/powerpoint/2010/main" val="2728353194"/>
+      </p:ext>
+    </p:extLst>
+  </p:cSld>
+  <p:clrMapOvr>
+    <a:masterClrMapping/>
+  </p:clrMapOvr>
+</p:sld>
+</file>
+
+<file path=ppt/slides/slide6.xml><?xml version="1.0" encoding="utf-8"?>
+<p:sld xmlns:a="http://schemas.openxmlformats.org/drawingml/2006/main" xmlns:r="http://schemas.openxmlformats.org/officeDocument/2006/relationships" xmlns:p="http://schemas.openxmlformats.org/presentationml/2006/main">
+  <p:cSld>
+    <p:spTree>
+      <p:nvGrpSpPr>
+        <p:cNvPr id="1" name=""/>
+        <p:cNvGrpSpPr/>
+        <p:nvPr/>
+      </p:nvGrpSpPr>
+      <p:grpSpPr>
+        <a:xfrm>
+          <a:off x="0" y="0"/>
+          <a:ext cx="0" cy="0"/>
+          <a:chOff x="0" y="0"/>
+          <a:chExt cx="0" cy="0"/>
+        </a:xfrm>
+      </p:grpSpPr>
+      <p:sp>
+        <p:nvSpPr>
+          <p:cNvPr id="2" name="Title 1"/>
+          <p:cNvSpPr>
+            <a:spLocks noGrp="1"/>
+          </p:cNvSpPr>
+          <p:nvPr>
+            <p:ph type="title"/>
+          </p:nvPr>
+        </p:nvSpPr>
+        <p:spPr/>
+        <p:txBody>
+          <a:bodyPr/>
+          <a:lstStyle/>
+          <a:p>
+            <a:r>
+              <a:rPr lang="en-US" dirty="0" smtClean="0"/>
+              <a:t>Estimating abundance</a:t>
+            </a:r>
+            <a:endParaRPr lang="en-GB" dirty="0"/>
+          </a:p>
+        </p:txBody>
+      </p:sp>
+      <p:sp>
+        <p:nvSpPr>
+          <p:cNvPr id="3" name="Content Placeholder 2"/>
+          <p:cNvSpPr>
+            <a:spLocks noGrp="1"/>
+          </p:cNvSpPr>
+          <p:nvPr>
+            <p:ph idx="1"/>
+          </p:nvPr>
+        </p:nvSpPr>
+        <p:spPr/>
+        <p:txBody>
+          <a:bodyPr/>
+          <a:lstStyle/>
+          <a:p>
+            <a:r>
+              <a:rPr lang="en-US" dirty="0" smtClean="0"/>
+              <a:t>Ways to improve this</a:t>
+            </a:r>
+          </a:p>
+          <a:p>
+            <a:pPr marL="858837" lvl="1" indent="-514350">
+              <a:buFont typeface="+mj-lt"/>
+              <a:buAutoNum type="arabicPeriod"/>
+            </a:pPr>
+            <a:r>
+              <a:rPr lang="en-US" dirty="0" smtClean="0"/>
+              <a:t>Smooth estimates of detection probability</a:t>
+            </a:r>
+          </a:p>
+          <a:p>
+            <a:pPr marL="858837" lvl="1" indent="-514350">
+              <a:buFont typeface="+mj-lt"/>
+              <a:buAutoNum type="arabicPeriod"/>
+            </a:pPr>
+            <a:r>
+              <a:rPr lang="en-US" dirty="0" smtClean="0"/>
+              <a:t>Model dynamics for each individual (births + deaths + detections = Jolly-</a:t>
+            </a:r>
+            <a:r>
+              <a:rPr lang="en-US" dirty="0" err="1" smtClean="0"/>
+              <a:t>Seber</a:t>
+            </a:r>
+            <a:r>
+              <a:rPr lang="en-US" smtClean="0"/>
+              <a:t> model)</a:t>
+            </a:r>
+            <a:endParaRPr lang="en-GB"/>
+          </a:p>
+        </p:txBody>
+      </p:sp>
+    </p:spTree>
+    <p:extLst>
+      <p:ext uri="{BB962C8B-B14F-4D97-AF65-F5344CB8AC3E}">
+        <p14:creationId xmlns:p14="http://schemas.microsoft.com/office/powerpoint/2010/main" val="1857016548"/>
       </p:ext>
     </p:extLst>
   </p:cSld>

</xml_diff>